<commit_message>
Add restful api test example and lib, add run_multi_tests tool
</commit_message>
<xml_diff>
--- a/documentation/Light-weighted Test Harness introduction.pptx
+++ b/documentation/Light-weighted Test Harness introduction.pptx
@@ -9,7 +9,8 @@
     <p:sldId id="258" r:id="rId3"/>
     <p:sldId id="259" r:id="rId4"/>
     <p:sldId id="260" r:id="rId5"/>
-    <p:sldId id="262" r:id="rId6"/>
+    <p:sldId id="263" r:id="rId6"/>
+    <p:sldId id="262" r:id="rId7"/>
   </p:sldIdLst>
   <p:sldSz cx="9144000" cy="6858000" type="screen4x3"/>
   <p:notesSz cx="6858000" cy="9144000"/>
@@ -292,7 +293,7 @@
           <a:p>
             <a:fld id="{70C60C03-90B8-4CA7-9BCD-F51882F62742}" type="datetimeFigureOut">
               <a:rPr lang="en-US" smtClean="0"/>
-              <a:t>4/28/2016</a:t>
+              <a:t>4/29/2016</a:t>
             </a:fld>
             <a:endParaRPr lang="en-US"/>
           </a:p>
@@ -462,7 +463,7 @@
           <a:p>
             <a:fld id="{70C60C03-90B8-4CA7-9BCD-F51882F62742}" type="datetimeFigureOut">
               <a:rPr lang="en-US" smtClean="0"/>
-              <a:t>4/28/2016</a:t>
+              <a:t>4/29/2016</a:t>
             </a:fld>
             <a:endParaRPr lang="en-US"/>
           </a:p>
@@ -642,7 +643,7 @@
           <a:p>
             <a:fld id="{70C60C03-90B8-4CA7-9BCD-F51882F62742}" type="datetimeFigureOut">
               <a:rPr lang="en-US" smtClean="0"/>
-              <a:t>4/28/2016</a:t>
+              <a:t>4/29/2016</a:t>
             </a:fld>
             <a:endParaRPr lang="en-US"/>
           </a:p>
@@ -812,7 +813,7 @@
           <a:p>
             <a:fld id="{70C60C03-90B8-4CA7-9BCD-F51882F62742}" type="datetimeFigureOut">
               <a:rPr lang="en-US" smtClean="0"/>
-              <a:t>4/28/2016</a:t>
+              <a:t>4/29/2016</a:t>
             </a:fld>
             <a:endParaRPr lang="en-US"/>
           </a:p>
@@ -1058,7 +1059,7 @@
           <a:p>
             <a:fld id="{70C60C03-90B8-4CA7-9BCD-F51882F62742}" type="datetimeFigureOut">
               <a:rPr lang="en-US" smtClean="0"/>
-              <a:t>4/28/2016</a:t>
+              <a:t>4/29/2016</a:t>
             </a:fld>
             <a:endParaRPr lang="en-US"/>
           </a:p>
@@ -1346,7 +1347,7 @@
           <a:p>
             <a:fld id="{70C60C03-90B8-4CA7-9BCD-F51882F62742}" type="datetimeFigureOut">
               <a:rPr lang="en-US" smtClean="0"/>
-              <a:t>4/28/2016</a:t>
+              <a:t>4/29/2016</a:t>
             </a:fld>
             <a:endParaRPr lang="en-US"/>
           </a:p>
@@ -1768,7 +1769,7 @@
           <a:p>
             <a:fld id="{70C60C03-90B8-4CA7-9BCD-F51882F62742}" type="datetimeFigureOut">
               <a:rPr lang="en-US" smtClean="0"/>
-              <a:t>4/28/2016</a:t>
+              <a:t>4/29/2016</a:t>
             </a:fld>
             <a:endParaRPr lang="en-US"/>
           </a:p>
@@ -1886,7 +1887,7 @@
           <a:p>
             <a:fld id="{70C60C03-90B8-4CA7-9BCD-F51882F62742}" type="datetimeFigureOut">
               <a:rPr lang="en-US" smtClean="0"/>
-              <a:t>4/28/2016</a:t>
+              <a:t>4/29/2016</a:t>
             </a:fld>
             <a:endParaRPr lang="en-US"/>
           </a:p>
@@ -1981,7 +1982,7 @@
           <a:p>
             <a:fld id="{70C60C03-90B8-4CA7-9BCD-F51882F62742}" type="datetimeFigureOut">
               <a:rPr lang="en-US" smtClean="0"/>
-              <a:t>4/28/2016</a:t>
+              <a:t>4/29/2016</a:t>
             </a:fld>
             <a:endParaRPr lang="en-US"/>
           </a:p>
@@ -2258,7 +2259,7 @@
           <a:p>
             <a:fld id="{70C60C03-90B8-4CA7-9BCD-F51882F62742}" type="datetimeFigureOut">
               <a:rPr lang="en-US" smtClean="0"/>
-              <a:t>4/28/2016</a:t>
+              <a:t>4/29/2016</a:t>
             </a:fld>
             <a:endParaRPr lang="en-US"/>
           </a:p>
@@ -2511,7 +2512,7 @@
           <a:p>
             <a:fld id="{70C60C03-90B8-4CA7-9BCD-F51882F62742}" type="datetimeFigureOut">
               <a:rPr lang="en-US" smtClean="0"/>
-              <a:t>4/28/2016</a:t>
+              <a:t>4/29/2016</a:t>
             </a:fld>
             <a:endParaRPr lang="en-US"/>
           </a:p>
@@ -2724,7 +2725,7 @@
           <a:p>
             <a:fld id="{70C60C03-90B8-4CA7-9BCD-F51882F62742}" type="datetimeFigureOut">
               <a:rPr lang="en-US" smtClean="0"/>
-              <a:t>4/28/2016</a:t>
+              <a:t>4/29/2016</a:t>
             </a:fld>
             <a:endParaRPr lang="en-US"/>
           </a:p>
@@ -3128,14 +3129,6 @@
               </a:rPr>
               <a:t>Light-weighted Test Harness introduction</a:t>
             </a:r>
-            <a:endParaRPr lang="en-US" sz="3600" b="1" dirty="0">
-              <a:solidFill>
-                <a:srgbClr val="2C95DD"/>
-              </a:solidFill>
-              <a:latin typeface="MetaNormalLF-Roman" pitchFamily="34" charset="0"/>
-              <a:ea typeface="+mn-ea"/>
-              <a:cs typeface="+mn-cs"/>
-            </a:endParaRPr>
           </a:p>
         </p:txBody>
       </p:sp>
@@ -3155,14 +3148,6 @@
           <a:lstStyle/>
           <a:p>
             <a:pPr algn="r"/>
-            <a:r>
-              <a:rPr lang="en-US" sz="2000" dirty="0" smtClean="0"/>
-              <a:t>Tina </a:t>
-            </a:r>
-            <a:r>
-              <a:rPr lang="en-US" sz="2000" dirty="0" smtClean="0"/>
-              <a:t>Yan 20160427</a:t>
-            </a:r>
             <a:endParaRPr lang="en-US" sz="2000" dirty="0"/>
           </a:p>
         </p:txBody>
@@ -3290,11 +3275,7 @@
           <a:p>
             <a:r>
               <a:rPr lang="en-US" sz="2000" dirty="0" smtClean="0"/>
-              <a:t>We investigated several test automation frameworks and found most of them are too heavy and will </a:t>
-            </a:r>
-            <a:r>
-              <a:rPr lang="en-US" sz="2000" dirty="0" smtClean="0"/>
-              <a:t>cost lots of learning effort. </a:t>
+              <a:t>We investigated several test automation frameworks and found most of them are too heavy and will cost lots of learning effort. </a:t>
             </a:r>
           </a:p>
           <a:p>
@@ -3313,7 +3294,7 @@
           <a:p>
             <a:r>
               <a:rPr lang="en-US" sz="2000" dirty="0" smtClean="0"/>
-              <a:t>Then we developed this test harness. It meets all our needs above.</a:t>
+              <a:t>Then we developed this test harness. It meets all our needs above. </a:t>
             </a:r>
           </a:p>
         </p:txBody>
@@ -3564,7 +3545,22 @@
                       <a:rPr lang="en-US" dirty="0" smtClean="0"/>
                       <a:t>Test Harness</a:t>
                     </a:r>
-                    <a:endParaRPr lang="en-US" dirty="0"/>
+                  </a:p>
+                  <a:p>
+                    <a:pPr algn="ctr"/>
+                    <a:r>
+                      <a:rPr lang="en-US" sz="1200" dirty="0" err="1" smtClean="0"/>
+                      <a:t>Run_multi_Tests</a:t>
+                    </a:r>
+                    <a:endParaRPr lang="en-US" sz="1200" dirty="0" smtClean="0"/>
+                  </a:p>
+                  <a:p>
+                    <a:pPr algn="ctr"/>
+                    <a:r>
+                      <a:rPr lang="en-US" sz="1200" dirty="0" err="1" smtClean="0"/>
+                      <a:t>http_wrapper</a:t>
+                    </a:r>
+                    <a:endParaRPr lang="en-US" sz="1200" dirty="0"/>
                   </a:p>
                 </p:txBody>
               </p:sp>
@@ -4042,18 +4038,7 @@
                 <a:ea typeface="+mj-ea"/>
                 <a:cs typeface="+mj-cs"/>
               </a:rPr>
-              <a:t>What is this Test </a:t>
-            </a:r>
-            <a:r>
-              <a:rPr lang="en-US" sz="3600" b="1" dirty="0" smtClean="0">
-                <a:solidFill>
-                  <a:srgbClr val="2C95DD"/>
-                </a:solidFill>
-                <a:latin typeface="MetaNormalLF-Roman" pitchFamily="34" charset="0"/>
-                <a:ea typeface="+mj-ea"/>
-                <a:cs typeface="+mj-cs"/>
-              </a:rPr>
-              <a:t>Harness </a:t>
+              <a:t>What is this Test Harness </a:t>
             </a:r>
             <a:endParaRPr lang="en-US" sz="3600" b="1" dirty="0">
               <a:solidFill>
@@ -4377,11 +4362,7 @@
             </a:r>
             <a:r>
               <a:rPr lang="en-US" sz="2000" dirty="0" smtClean="0"/>
-              <a:t>and how to validate the </a:t>
-            </a:r>
-            <a:r>
-              <a:rPr lang="en-US" sz="2000" dirty="0" smtClean="0"/>
-              <a:t>results</a:t>
+              <a:t>and how to validate the results</a:t>
             </a:r>
             <a:r>
               <a:rPr lang="en-US" sz="2000" dirty="0"/>
@@ -4403,11 +4384,7 @@
             </a:pPr>
             <a:r>
               <a:rPr lang="en-US" sz="2000" dirty="0" smtClean="0"/>
-              <a:t>Testers could </a:t>
-            </a:r>
-            <a:r>
-              <a:rPr lang="en-US" sz="2000" dirty="0" smtClean="0"/>
-              <a:t>leverage existing test code, like common libraries. </a:t>
+              <a:t>Testers could leverage existing test code, like common libraries. </a:t>
             </a:r>
             <a:endParaRPr lang="en-US" sz="2000" dirty="0"/>
           </a:p>
@@ -4470,6 +4447,190 @@
       </p:grpSpPr>
       <p:sp>
         <p:nvSpPr>
+          <p:cNvPr id="4" name="Rectangle 3"/>
+          <p:cNvSpPr/>
+          <p:nvPr/>
+        </p:nvSpPr>
+        <p:spPr>
+          <a:xfrm>
+            <a:off x="762000" y="548680"/>
+            <a:ext cx="1495218" cy="646331"/>
+          </a:xfrm>
+          <a:prstGeom prst="rect">
+            <a:avLst/>
+          </a:prstGeom>
+        </p:spPr>
+        <p:txBody>
+          <a:bodyPr wrap="none">
+            <a:spAutoFit/>
+          </a:bodyPr>
+          <a:lstStyle/>
+          <a:p>
+            <a:pPr lvl="0" fontAlgn="base">
+              <a:spcBef>
+                <a:spcPct val="0"/>
+              </a:spcBef>
+              <a:spcAft>
+                <a:spcPct val="0"/>
+              </a:spcAft>
+              <a:defRPr/>
+            </a:pPr>
+            <a:r>
+              <a:rPr lang="en-US" sz="3600" b="1" dirty="0" smtClean="0">
+                <a:solidFill>
+                  <a:srgbClr val="2C95DD"/>
+                </a:solidFill>
+                <a:latin typeface="MetaNormalLF-Roman" pitchFamily="34" charset="0"/>
+              </a:rPr>
+              <a:t>Others</a:t>
+            </a:r>
+            <a:endParaRPr lang="en-US" sz="3600" b="1" dirty="0">
+              <a:solidFill>
+                <a:srgbClr val="2C95DD"/>
+              </a:solidFill>
+              <a:latin typeface="MetaNormalLF-Roman" pitchFamily="34" charset="0"/>
+            </a:endParaRPr>
+          </a:p>
+        </p:txBody>
+      </p:sp>
+      <p:sp>
+        <p:nvSpPr>
+          <p:cNvPr id="5" name="TextBox 4"/>
+          <p:cNvSpPr txBox="1"/>
+          <p:nvPr/>
+        </p:nvSpPr>
+        <p:spPr>
+          <a:xfrm>
+            <a:off x="1403648" y="1196752"/>
+            <a:ext cx="6552728" cy="2246769"/>
+          </a:xfrm>
+          <a:prstGeom prst="rect">
+            <a:avLst/>
+          </a:prstGeom>
+          <a:noFill/>
+        </p:spPr>
+        <p:txBody>
+          <a:bodyPr wrap="square" rtlCol="0">
+            <a:spAutoFit/>
+          </a:bodyPr>
+          <a:lstStyle/>
+          <a:p>
+            <a:pPr marL="457200" indent="-457200">
+              <a:buFont typeface="+mj-lt"/>
+              <a:buAutoNum type="arabicPeriod"/>
+            </a:pPr>
+            <a:endParaRPr lang="en-US" sz="2000" dirty="0" smtClean="0"/>
+          </a:p>
+          <a:p>
+            <a:pPr marL="457200" indent="-457200">
+              <a:buFont typeface="+mj-lt"/>
+              <a:buAutoNum type="arabicPeriod"/>
+            </a:pPr>
+            <a:r>
+              <a:rPr lang="en-US" sz="2000" dirty="0" smtClean="0"/>
+              <a:t>You could use this test harness for restful API test (not limited to).  We provide </a:t>
+            </a:r>
+            <a:r>
+              <a:rPr lang="en-US" sz="2000" dirty="0" err="1" smtClean="0"/>
+              <a:t>http_wrapper_lib</a:t>
+            </a:r>
+            <a:r>
+              <a:rPr lang="en-US" sz="2000" dirty="0"/>
+              <a:t> </a:t>
+            </a:r>
+            <a:r>
+              <a:rPr lang="en-US" sz="2000" dirty="0" smtClean="0"/>
+              <a:t>to </a:t>
+            </a:r>
+            <a:r>
+              <a:rPr lang="en-US" sz="2000" dirty="0" smtClean="0"/>
+              <a:t>support this. </a:t>
+            </a:r>
+            <a:r>
+              <a:rPr lang="en-US" sz="2000" dirty="0" smtClean="0"/>
+              <a:t>Please see examples for its usage.</a:t>
+            </a:r>
+            <a:endParaRPr lang="en-US" sz="2000" dirty="0"/>
+          </a:p>
+          <a:p>
+            <a:pPr marL="342900" indent="-342900">
+              <a:buFont typeface="+mj-lt"/>
+              <a:buAutoNum type="arabicPeriod"/>
+            </a:pPr>
+            <a:endParaRPr lang="en-US" sz="2000" dirty="0" smtClean="0"/>
+          </a:p>
+          <a:p>
+            <a:pPr marL="342900" indent="-342900">
+              <a:buFont typeface="+mj-lt"/>
+              <a:buAutoNum type="arabicPeriod"/>
+            </a:pPr>
+            <a:r>
+              <a:rPr lang="en-US" sz="2000" dirty="0" smtClean="0"/>
+              <a:t>We also provide a handy tool, </a:t>
+            </a:r>
+            <a:r>
+              <a:rPr lang="en-US" sz="2000" dirty="0" err="1" smtClean="0"/>
+              <a:t>run_multi_tests</a:t>
+            </a:r>
+            <a:r>
+              <a:rPr lang="en-US" sz="2000" dirty="0" smtClean="0"/>
+              <a:t>, to help </a:t>
+            </a:r>
+            <a:r>
+              <a:rPr lang="en-US" sz="2000" dirty="0" smtClean="0"/>
+              <a:t>you </a:t>
+            </a:r>
+            <a:r>
+              <a:rPr lang="en-US" sz="2000" dirty="0" smtClean="0"/>
+              <a:t>execute </a:t>
+            </a:r>
+            <a:r>
+              <a:rPr lang="en-US" sz="2000" dirty="0" smtClean="0"/>
+              <a:t>multiple tests in parallel.</a:t>
+            </a:r>
+            <a:endParaRPr lang="en-US" sz="2000" dirty="0"/>
+          </a:p>
+        </p:txBody>
+      </p:sp>
+    </p:spTree>
+    <p:extLst>
+      <p:ext uri="{BB962C8B-B14F-4D97-AF65-F5344CB8AC3E}">
+        <p14:creationId xmlns:p14="http://schemas.microsoft.com/office/powerpoint/2010/main" val="4076643130"/>
+      </p:ext>
+    </p:extLst>
+  </p:cSld>
+  <p:clrMapOvr>
+    <a:masterClrMapping/>
+  </p:clrMapOvr>
+  <p:timing>
+    <p:tnLst>
+      <p:par>
+        <p:cTn id="1" dur="indefinite" restart="never" nodeType="tmRoot"/>
+      </p:par>
+    </p:tnLst>
+  </p:timing>
+</p:sld>
+</file>
+
+<file path=ppt/slides/slide6.xml><?xml version="1.0" encoding="utf-8"?>
+<p:sld xmlns:a="http://schemas.openxmlformats.org/drawingml/2006/main" xmlns:r="http://schemas.openxmlformats.org/officeDocument/2006/relationships" xmlns:p="http://schemas.openxmlformats.org/presentationml/2006/main">
+  <p:cSld>
+    <p:spTree>
+      <p:nvGrpSpPr>
+        <p:cNvPr id="1" name=""/>
+        <p:cNvGrpSpPr/>
+        <p:nvPr/>
+      </p:nvGrpSpPr>
+      <p:grpSpPr>
+        <a:xfrm>
+          <a:off x="0" y="0"/>
+          <a:ext cx="0" cy="0"/>
+          <a:chOff x="0" y="0"/>
+          <a:chExt cx="0" cy="0"/>
+        </a:xfrm>
+      </p:grpSpPr>
+      <p:sp>
+        <p:nvSpPr>
           <p:cNvPr id="4" name="Title 1"/>
           <p:cNvSpPr txBox="1">
             <a:spLocks/>
@@ -4515,7 +4676,29 @@
                 <a:ea typeface="+mj-ea"/>
                 <a:cs typeface="+mj-cs"/>
               </a:rPr>
-              <a:t>Where can I get it</a:t>
+              <a:t>Where can I get the </a:t>
+            </a:r>
+            <a:r>
+              <a:rPr lang="en-US" sz="3600" b="1" dirty="0">
+                <a:solidFill>
+                  <a:srgbClr val="2C95DD"/>
+                </a:solidFill>
+                <a:latin typeface="MetaNormalLF-Roman" pitchFamily="34" charset="0"/>
+                <a:ea typeface="+mj-ea"/>
+                <a:cs typeface="+mj-cs"/>
+              </a:rPr>
+              <a:t>T</a:t>
+            </a:r>
+            <a:r>
+              <a:rPr lang="en-US" sz="3600" b="1" dirty="0" smtClean="0">
+                <a:solidFill>
+                  <a:srgbClr val="2C95DD"/>
+                </a:solidFill>
+                <a:latin typeface="MetaNormalLF-Roman" pitchFamily="34" charset="0"/>
+                <a:ea typeface="+mj-ea"/>
+                <a:cs typeface="+mj-cs"/>
+              </a:rPr>
+              <a:t>est Harness</a:t>
             </a:r>
             <a:endParaRPr lang="en-US" sz="3600" b="1" dirty="0">
               <a:solidFill>
@@ -4537,7 +4720,7 @@
         <p:spPr>
           <a:xfrm>
             <a:off x="1403648" y="1196752"/>
-            <a:ext cx="6552728" cy="707886"/>
+            <a:ext cx="6552728" cy="1323439"/>
           </a:xfrm>
           <a:prstGeom prst="rect">
             <a:avLst/>
@@ -4569,14 +4752,437 @@
               </a:rPr>
               <a:t>github.com/Tina-Yan/TestHarness</a:t>
             </a:r>
+            <a:endParaRPr lang="en-US" sz="2000" dirty="0" smtClean="0"/>
+          </a:p>
+          <a:p>
+            <a:pPr marL="342900" indent="-342900">
+              <a:buFont typeface="+mj-lt"/>
+              <a:buAutoNum type="arabicPeriod"/>
+            </a:pPr>
+            <a:endParaRPr lang="en-US" sz="2000" dirty="0"/>
+          </a:p>
+          <a:p>
+            <a:pPr marL="342900" indent="-342900">
+              <a:buFont typeface="+mj-lt"/>
+              <a:buAutoNum type="arabicPeriod"/>
+            </a:pPr>
             <a:r>
               <a:rPr lang="en-US" sz="2000" dirty="0" smtClean="0"/>
+              <a:t>Directory structure </a:t>
+            </a:r>
+          </a:p>
+        </p:txBody>
+      </p:sp>
+      <p:sp>
+        <p:nvSpPr>
+          <p:cNvPr id="2" name="Rectangle 1"/>
+          <p:cNvSpPr/>
+          <p:nvPr/>
+        </p:nvSpPr>
+        <p:spPr>
+          <a:xfrm>
+            <a:off x="1752600" y="2895600"/>
+            <a:ext cx="2057400" cy="381000"/>
+          </a:xfrm>
+          <a:prstGeom prst="rect">
+            <a:avLst/>
+          </a:prstGeom>
+        </p:spPr>
+        <p:style>
+          <a:lnRef idx="1">
+            <a:schemeClr val="accent5"/>
+          </a:lnRef>
+          <a:fillRef idx="2">
+            <a:schemeClr val="accent5"/>
+          </a:fillRef>
+          <a:effectRef idx="1">
+            <a:schemeClr val="accent5"/>
+          </a:effectRef>
+          <a:fontRef idx="minor">
+            <a:schemeClr val="dk1"/>
+          </a:fontRef>
+        </p:style>
+        <p:txBody>
+          <a:bodyPr rtlCol="0" anchor="ctr"/>
+          <a:lstStyle/>
+          <a:p>
+            <a:pPr algn="ctr"/>
+            <a:r>
+              <a:rPr lang="en-US" dirty="0" err="1" smtClean="0"/>
+              <a:t>TestHarness</a:t>
+            </a:r>
+            <a:endParaRPr lang="en-US" dirty="0"/>
+          </a:p>
+        </p:txBody>
+      </p:sp>
+      <p:sp>
+        <p:nvSpPr>
+          <p:cNvPr id="6" name="Rectangle 5"/>
+          <p:cNvSpPr/>
+          <p:nvPr/>
+        </p:nvSpPr>
+        <p:spPr>
+          <a:xfrm>
+            <a:off x="3886200" y="3429000"/>
+            <a:ext cx="2057400" cy="381000"/>
+          </a:xfrm>
+          <a:prstGeom prst="rect">
+            <a:avLst/>
+          </a:prstGeom>
+        </p:spPr>
+        <p:style>
+          <a:lnRef idx="1">
+            <a:schemeClr val="accent5"/>
+          </a:lnRef>
+          <a:fillRef idx="2">
+            <a:schemeClr val="accent5"/>
+          </a:fillRef>
+          <a:effectRef idx="1">
+            <a:schemeClr val="accent5"/>
+          </a:effectRef>
+          <a:fontRef idx="minor">
+            <a:schemeClr val="dk1"/>
+          </a:fontRef>
+        </p:style>
+        <p:txBody>
+          <a:bodyPr rtlCol="0" anchor="ctr"/>
+          <a:lstStyle/>
+          <a:p>
+            <a:pPr algn="ctr"/>
+            <a:r>
+              <a:rPr lang="en-US" dirty="0" err="1" smtClean="0"/>
+              <a:t>test_harness</a:t>
+            </a:r>
+            <a:r>
+              <a:rPr lang="en-US" dirty="0" smtClean="0"/>
               <a:t> </a:t>
             </a:r>
-            <a:endParaRPr lang="en-US" sz="2000" dirty="0" smtClean="0"/>
-          </a:p>
-        </p:txBody>
-      </p:sp>
+            <a:endParaRPr lang="en-US" dirty="0"/>
+          </a:p>
+        </p:txBody>
+      </p:sp>
+      <p:sp>
+        <p:nvSpPr>
+          <p:cNvPr id="7" name="Rectangle 6"/>
+          <p:cNvSpPr/>
+          <p:nvPr/>
+        </p:nvSpPr>
+        <p:spPr>
+          <a:xfrm>
+            <a:off x="3886200" y="4191000"/>
+            <a:ext cx="2057400" cy="381000"/>
+          </a:xfrm>
+          <a:prstGeom prst="rect">
+            <a:avLst/>
+          </a:prstGeom>
+        </p:spPr>
+        <p:style>
+          <a:lnRef idx="1">
+            <a:schemeClr val="accent5"/>
+          </a:lnRef>
+          <a:fillRef idx="2">
+            <a:schemeClr val="accent5"/>
+          </a:fillRef>
+          <a:effectRef idx="1">
+            <a:schemeClr val="accent5"/>
+          </a:effectRef>
+          <a:fontRef idx="minor">
+            <a:schemeClr val="dk1"/>
+          </a:fontRef>
+        </p:style>
+        <p:txBody>
+          <a:bodyPr rtlCol="0" anchor="ctr"/>
+          <a:lstStyle/>
+          <a:p>
+            <a:pPr algn="ctr"/>
+            <a:r>
+              <a:rPr lang="en-US" dirty="0"/>
+              <a:t>t</a:t>
+            </a:r>
+            <a:r>
+              <a:rPr lang="en-US" dirty="0" smtClean="0"/>
+              <a:t>est _examples</a:t>
+            </a:r>
+            <a:endParaRPr lang="en-US" dirty="0"/>
+          </a:p>
+        </p:txBody>
+      </p:sp>
+      <p:sp>
+        <p:nvSpPr>
+          <p:cNvPr id="8" name="Rectangle 7"/>
+          <p:cNvSpPr/>
+          <p:nvPr/>
+        </p:nvSpPr>
+        <p:spPr>
+          <a:xfrm>
+            <a:off x="3886200" y="5257800"/>
+            <a:ext cx="2057400" cy="381000"/>
+          </a:xfrm>
+          <a:prstGeom prst="rect">
+            <a:avLst/>
+          </a:prstGeom>
+        </p:spPr>
+        <p:style>
+          <a:lnRef idx="1">
+            <a:schemeClr val="accent5"/>
+          </a:lnRef>
+          <a:fillRef idx="2">
+            <a:schemeClr val="accent5"/>
+          </a:fillRef>
+          <a:effectRef idx="1">
+            <a:schemeClr val="accent5"/>
+          </a:effectRef>
+          <a:fontRef idx="minor">
+            <a:schemeClr val="dk1"/>
+          </a:fontRef>
+        </p:style>
+        <p:txBody>
+          <a:bodyPr rtlCol="0" anchor="ctr"/>
+          <a:lstStyle/>
+          <a:p>
+            <a:pPr algn="ctr"/>
+            <a:r>
+              <a:rPr lang="en-US" dirty="0" smtClean="0"/>
+              <a:t>documentation</a:t>
+            </a:r>
+            <a:endParaRPr lang="en-US" dirty="0"/>
+          </a:p>
+        </p:txBody>
+      </p:sp>
+      <p:sp>
+        <p:nvSpPr>
+          <p:cNvPr id="9" name="Rectangle 8"/>
+          <p:cNvSpPr/>
+          <p:nvPr/>
+        </p:nvSpPr>
+        <p:spPr>
+          <a:xfrm>
+            <a:off x="6019800" y="4724400"/>
+            <a:ext cx="2057400" cy="381000"/>
+          </a:xfrm>
+          <a:prstGeom prst="rect">
+            <a:avLst/>
+          </a:prstGeom>
+        </p:spPr>
+        <p:style>
+          <a:lnRef idx="1">
+            <a:schemeClr val="accent5"/>
+          </a:lnRef>
+          <a:fillRef idx="2">
+            <a:schemeClr val="accent5"/>
+          </a:fillRef>
+          <a:effectRef idx="1">
+            <a:schemeClr val="accent5"/>
+          </a:effectRef>
+          <a:fontRef idx="minor">
+            <a:schemeClr val="dk1"/>
+          </a:fontRef>
+        </p:style>
+        <p:txBody>
+          <a:bodyPr rtlCol="0" anchor="ctr"/>
+          <a:lstStyle/>
+          <a:p>
+            <a:pPr algn="ctr"/>
+            <a:r>
+              <a:rPr lang="en-US" dirty="0" err="1" smtClean="0"/>
+              <a:t>rest_api_test</a:t>
+            </a:r>
+            <a:endParaRPr lang="en-US" dirty="0"/>
+          </a:p>
+        </p:txBody>
+      </p:sp>
+      <p:cxnSp>
+        <p:nvCxnSpPr>
+          <p:cNvPr id="10" name="Straight Connector 9"/>
+          <p:cNvCxnSpPr>
+            <a:stCxn id="2" idx="2"/>
+          </p:cNvCxnSpPr>
+          <p:nvPr/>
+        </p:nvCxnSpPr>
+        <p:spPr>
+          <a:xfrm>
+            <a:off x="2781300" y="3276600"/>
+            <a:ext cx="0" cy="2171700"/>
+          </a:xfrm>
+          <a:prstGeom prst="line">
+            <a:avLst/>
+          </a:prstGeom>
+        </p:spPr>
+        <p:style>
+          <a:lnRef idx="1">
+            <a:schemeClr val="accent1"/>
+          </a:lnRef>
+          <a:fillRef idx="0">
+            <a:schemeClr val="accent1"/>
+          </a:fillRef>
+          <a:effectRef idx="0">
+            <a:schemeClr val="accent1"/>
+          </a:effectRef>
+          <a:fontRef idx="minor">
+            <a:schemeClr val="tx1"/>
+          </a:fontRef>
+        </p:style>
+      </p:cxnSp>
+      <p:cxnSp>
+        <p:nvCxnSpPr>
+          <p:cNvPr id="12" name="Straight Connector 11"/>
+          <p:cNvCxnSpPr>
+            <a:endCxn id="8" idx="1"/>
+          </p:cNvCxnSpPr>
+          <p:nvPr/>
+        </p:nvCxnSpPr>
+        <p:spPr>
+          <a:xfrm>
+            <a:off x="2781300" y="5448300"/>
+            <a:ext cx="1104900" cy="0"/>
+          </a:xfrm>
+          <a:prstGeom prst="line">
+            <a:avLst/>
+          </a:prstGeom>
+        </p:spPr>
+        <p:style>
+          <a:lnRef idx="1">
+            <a:schemeClr val="accent1"/>
+          </a:lnRef>
+          <a:fillRef idx="0">
+            <a:schemeClr val="accent1"/>
+          </a:fillRef>
+          <a:effectRef idx="0">
+            <a:schemeClr val="accent1"/>
+          </a:effectRef>
+          <a:fontRef idx="minor">
+            <a:schemeClr val="tx1"/>
+          </a:fontRef>
+        </p:style>
+      </p:cxnSp>
+      <p:cxnSp>
+        <p:nvCxnSpPr>
+          <p:cNvPr id="14" name="Straight Connector 13"/>
+          <p:cNvCxnSpPr>
+            <a:endCxn id="7" idx="1"/>
+          </p:cNvCxnSpPr>
+          <p:nvPr/>
+        </p:nvCxnSpPr>
+        <p:spPr>
+          <a:xfrm>
+            <a:off x="2781300" y="4381500"/>
+            <a:ext cx="1104900" cy="0"/>
+          </a:xfrm>
+          <a:prstGeom prst="line">
+            <a:avLst/>
+          </a:prstGeom>
+        </p:spPr>
+        <p:style>
+          <a:lnRef idx="1">
+            <a:schemeClr val="accent1"/>
+          </a:lnRef>
+          <a:fillRef idx="0">
+            <a:schemeClr val="accent1"/>
+          </a:fillRef>
+          <a:effectRef idx="0">
+            <a:schemeClr val="accent1"/>
+          </a:effectRef>
+          <a:fontRef idx="minor">
+            <a:schemeClr val="tx1"/>
+          </a:fontRef>
+        </p:style>
+      </p:cxnSp>
+      <p:cxnSp>
+        <p:nvCxnSpPr>
+          <p:cNvPr id="16" name="Straight Connector 15"/>
+          <p:cNvCxnSpPr>
+            <a:stCxn id="6" idx="1"/>
+          </p:cNvCxnSpPr>
+          <p:nvPr/>
+        </p:nvCxnSpPr>
+        <p:spPr>
+          <a:xfrm flipH="1">
+            <a:off x="2781300" y="3619500"/>
+            <a:ext cx="1104900" cy="0"/>
+          </a:xfrm>
+          <a:prstGeom prst="line">
+            <a:avLst/>
+          </a:prstGeom>
+        </p:spPr>
+        <p:style>
+          <a:lnRef idx="1">
+            <a:schemeClr val="accent1"/>
+          </a:lnRef>
+          <a:fillRef idx="0">
+            <a:schemeClr val="accent1"/>
+          </a:fillRef>
+          <a:effectRef idx="0">
+            <a:schemeClr val="accent1"/>
+          </a:effectRef>
+          <a:fontRef idx="minor">
+            <a:schemeClr val="tx1"/>
+          </a:fontRef>
+        </p:style>
+      </p:cxnSp>
+      <p:cxnSp>
+        <p:nvCxnSpPr>
+          <p:cNvPr id="19" name="Straight Connector 18"/>
+          <p:cNvCxnSpPr>
+            <a:stCxn id="7" idx="2"/>
+          </p:cNvCxnSpPr>
+          <p:nvPr/>
+        </p:nvCxnSpPr>
+        <p:spPr>
+          <a:xfrm>
+            <a:off x="4914900" y="4572000"/>
+            <a:ext cx="0" cy="342900"/>
+          </a:xfrm>
+          <a:prstGeom prst="line">
+            <a:avLst/>
+          </a:prstGeom>
+        </p:spPr>
+        <p:style>
+          <a:lnRef idx="1">
+            <a:schemeClr val="accent1"/>
+          </a:lnRef>
+          <a:fillRef idx="0">
+            <a:schemeClr val="accent1"/>
+          </a:fillRef>
+          <a:effectRef idx="0">
+            <a:schemeClr val="accent1"/>
+          </a:effectRef>
+          <a:fontRef idx="minor">
+            <a:schemeClr val="tx1"/>
+          </a:fontRef>
+        </p:style>
+      </p:cxnSp>
+      <p:cxnSp>
+        <p:nvCxnSpPr>
+          <p:cNvPr id="21" name="Straight Connector 20"/>
+          <p:cNvCxnSpPr>
+            <a:stCxn id="9" idx="1"/>
+          </p:cNvCxnSpPr>
+          <p:nvPr/>
+        </p:nvCxnSpPr>
+        <p:spPr>
+          <a:xfrm flipH="1">
+            <a:off x="4914900" y="4914900"/>
+            <a:ext cx="1104900" cy="0"/>
+          </a:xfrm>
+          <a:prstGeom prst="line">
+            <a:avLst/>
+          </a:prstGeom>
+        </p:spPr>
+        <p:style>
+          <a:lnRef idx="1">
+            <a:schemeClr val="accent1"/>
+          </a:lnRef>
+          <a:fillRef idx="0">
+            <a:schemeClr val="accent1"/>
+          </a:fillRef>
+          <a:effectRef idx="0">
+            <a:schemeClr val="accent1"/>
+          </a:effectRef>
+          <a:fontRef idx="minor">
+            <a:schemeClr val="tx1"/>
+          </a:fontRef>
+        </p:style>
+      </p:cxnSp>
     </p:spTree>
     <p:extLst>
       <p:ext uri="{BB962C8B-B14F-4D97-AF65-F5344CB8AC3E}">

</xml_diff>